<commit_message>
PPT CHANGED AND PDF ADDED
</commit_message>
<xml_diff>
--- a/sram/sram noise margin.pptx
+++ b/sram/sram noise margin.pptx
@@ -8239,8 +8239,19 @@
             </a:br>
             <a:r>
               <a:rPr lang="en-US" altLang="zh-TW" dirty="0"/>
-              <a:t>B11901027</a:t>
+              <a:t>B11901027 </a:t>
             </a:r>
+            <a:r>
+              <a:rPr lang="zh-TW" altLang="en-US" dirty="0">
+                <a:latin typeface="思源宋體 Light" panose="02020300000000000000" pitchFamily="18" charset="-120"/>
+                <a:ea typeface="思源宋體 Light" panose="02020300000000000000" pitchFamily="18" charset="-120"/>
+              </a:rPr>
+              <a:t>王仁軒</a:t>
+            </a:r>
+            <a:endParaRPr lang="en-US" altLang="zh-TW" dirty="0">
+              <a:latin typeface="思源宋體 Light" panose="02020300000000000000" pitchFamily="18" charset="-120"/>
+              <a:ea typeface="思源宋體 Light" panose="02020300000000000000" pitchFamily="18" charset="-120"/>
+            </a:endParaRPr>
           </a:p>
         </p:txBody>
       </p:sp>
@@ -8625,8 +8636,8 @@
           </a:p>
         </p:txBody>
       </p:sp>
-      <mc:AlternateContent xmlns:mc="http://schemas.openxmlformats.org/markup-compatibility/2006">
-        <mc:Choice xmlns:a14="http://schemas.microsoft.com/office/drawing/2010/main" Requires="a14">
+      <mc:AlternateContent xmlns:mc="http://schemas.openxmlformats.org/markup-compatibility/2006" xmlns:a14="http://schemas.microsoft.com/office/drawing/2010/main">
+        <mc:Choice Requires="a14">
           <p:sp>
             <p:nvSpPr>
               <p:cNvPr id="3" name="內容版面配置區 2">
@@ -8717,7 +8728,7 @@
             </p:txBody>
           </p:sp>
         </mc:Choice>
-        <mc:Fallback>
+        <mc:Fallback xmlns="">
           <p:sp>
             <p:nvSpPr>
               <p:cNvPr id="3" name="內容版面配置區 2">
@@ -9447,8 +9458,8 @@
           </a:prstGeom>
         </p:spPr>
       </p:pic>
-      <mc:AlternateContent xmlns:mc="http://schemas.openxmlformats.org/markup-compatibility/2006">
-        <mc:Choice xmlns:a14="http://schemas.microsoft.com/office/drawing/2010/main" Requires="a14">
+      <mc:AlternateContent xmlns:mc="http://schemas.openxmlformats.org/markup-compatibility/2006" xmlns:a14="http://schemas.microsoft.com/office/drawing/2010/main">
+        <mc:Choice Requires="a14">
           <p:sp>
             <p:nvSpPr>
               <p:cNvPr id="14" name="文字方塊 13">
@@ -9498,7 +9509,7 @@
             </p:txBody>
           </p:sp>
         </mc:Choice>
-        <mc:Fallback>
+        <mc:Fallback xmlns="">
           <p:sp>
             <p:nvSpPr>
               <p:cNvPr id="14" name="文字方塊 13">
@@ -9543,8 +9554,8 @@
           </p:sp>
         </mc:Fallback>
       </mc:AlternateContent>
-      <mc:AlternateContent xmlns:mc="http://schemas.openxmlformats.org/markup-compatibility/2006">
-        <mc:Choice xmlns:a14="http://schemas.microsoft.com/office/drawing/2010/main" Requires="a14">
+      <mc:AlternateContent xmlns:mc="http://schemas.openxmlformats.org/markup-compatibility/2006" xmlns:a14="http://schemas.microsoft.com/office/drawing/2010/main">
+        <mc:Choice Requires="a14">
           <p:sp>
             <p:nvSpPr>
               <p:cNvPr id="16" name="文字方塊 15">
@@ -9594,7 +9605,7 @@
             </p:txBody>
           </p:sp>
         </mc:Choice>
-        <mc:Fallback>
+        <mc:Fallback xmlns="">
           <p:sp>
             <p:nvSpPr>
               <p:cNvPr id="16" name="文字方塊 15">
@@ -9768,7 +9779,7 @@
           <a:p>
             <a:r>
               <a:rPr lang="en-US" altLang="zh-TW" dirty="0"/>
-              <a:t>Get and download data</a:t>
+              <a:t>Download data</a:t>
             </a:r>
           </a:p>
           <a:p>
@@ -9781,7 +9792,15 @@
             <a:pPr lvl="1"/>
             <a:r>
               <a:rPr lang="en-US" altLang="zh-TW" dirty="0"/>
-              <a:t>Rotate curves by 45 degree</a:t>
+              <a:t>Rotate the curves </a:t>
+            </a:r>
+            <a:r>
+              <a:rPr lang="en-US" altLang="zh-TW" dirty="0" err="1"/>
+              <a:t>ccw</a:t>
+            </a:r>
+            <a:r>
+              <a:rPr lang="en-US" altLang="zh-TW" dirty="0"/>
+              <a:t> by 45 degree</a:t>
             </a:r>
           </a:p>
           <a:p>
@@ -9797,7 +9816,37 @@
               <a:rPr lang="en-US" altLang="zh-TW" dirty="0"/>
               <a:t>Find min(local maximum, -local minimum)</a:t>
             </a:r>
-            <a:endParaRPr lang="zh-TW" altLang="en-US" dirty="0"/>
+            <a:r>
+              <a:rPr lang="zh-TW" altLang="en-US" dirty="0"/>
+              <a:t> </a:t>
+            </a:r>
+            <a:r>
+              <a:rPr lang="en-US" altLang="zh-TW" dirty="0"/>
+              <a:t>for</a:t>
+            </a:r>
+            <a:r>
+              <a:rPr lang="zh-TW" altLang="en-US" dirty="0"/>
+              <a:t> </a:t>
+            </a:r>
+            <a:r>
+              <a:rPr lang="en-US" altLang="zh-TW" dirty="0"/>
+              <a:t>SNM, RNM</a:t>
+            </a:r>
+          </a:p>
+          <a:p>
+            <a:pPr lvl="1"/>
+            <a:r>
+              <a:rPr lang="en-US" altLang="zh-TW" dirty="0"/>
+              <a:t>Find local maximum (or</a:t>
+            </a:r>
+            <a:r>
+              <a:rPr lang="zh-TW" altLang="en-US" dirty="0"/>
+              <a:t> </a:t>
+            </a:r>
+            <a:r>
+              <a:rPr lang="en-US" altLang="zh-TW" dirty="0"/>
+              <a:t>global maximum) for WNM</a:t>
+            </a:r>
           </a:p>
         </p:txBody>
       </p:sp>
@@ -10486,8 +10535,8 @@
           </a:p>
         </p:txBody>
       </p:sp>
-      <mc:AlternateContent xmlns:mc="http://schemas.openxmlformats.org/markup-compatibility/2006">
-        <mc:Choice xmlns:a14="http://schemas.microsoft.com/office/drawing/2010/main" Requires="a14">
+      <mc:AlternateContent xmlns:mc="http://schemas.openxmlformats.org/markup-compatibility/2006" xmlns:a14="http://schemas.microsoft.com/office/drawing/2010/main">
+        <mc:Choice Requires="a14">
           <p:sp>
             <p:nvSpPr>
               <p:cNvPr id="3" name="內容版面配置區 2">
@@ -10578,7 +10627,7 @@
             </p:txBody>
           </p:sp>
         </mc:Choice>
-        <mc:Fallback>
+        <mc:Fallback xmlns="">
           <p:sp>
             <p:nvSpPr>
               <p:cNvPr id="3" name="內容版面配置區 2">
@@ -11555,8 +11604,8 @@
           </a:p>
         </p:txBody>
       </p:sp>
-      <mc:AlternateContent xmlns:mc="http://schemas.openxmlformats.org/markup-compatibility/2006">
-        <mc:Choice xmlns:a14="http://schemas.microsoft.com/office/drawing/2010/main" Requires="a14">
+      <mc:AlternateContent xmlns:mc="http://schemas.openxmlformats.org/markup-compatibility/2006" xmlns:a14="http://schemas.microsoft.com/office/drawing/2010/main">
+        <mc:Choice Requires="a14">
           <p:sp>
             <p:nvSpPr>
               <p:cNvPr id="3" name="內容版面配置區 2">
@@ -11622,7 +11671,7 @@
             </p:txBody>
           </p:sp>
         </mc:Choice>
-        <mc:Fallback>
+        <mc:Fallback xmlns="">
           <p:sp>
             <p:nvSpPr>
               <p:cNvPr id="3" name="內容版面配置區 2">
@@ -11784,8 +11833,8 @@
           </a:p>
         </p:txBody>
       </p:sp>
-      <mc:AlternateContent xmlns:mc="http://schemas.openxmlformats.org/markup-compatibility/2006">
-        <mc:Choice xmlns:a14="http://schemas.microsoft.com/office/drawing/2010/main" Requires="a14">
+      <mc:AlternateContent xmlns:mc="http://schemas.openxmlformats.org/markup-compatibility/2006" xmlns:a14="http://schemas.microsoft.com/office/drawing/2010/main">
+        <mc:Choice Requires="a14">
           <p:sp>
             <p:nvSpPr>
               <p:cNvPr id="3" name="內容版面配置區 2">
@@ -11879,7 +11928,7 @@
             </p:txBody>
           </p:sp>
         </mc:Choice>
-        <mc:Fallback>
+        <mc:Fallback xmlns="">
           <p:sp>
             <p:nvSpPr>
               <p:cNvPr id="3" name="內容版面配置區 2">

</xml_diff>